<commit_message>
class x lab 9
</commit_message>
<xml_diff>
--- a/class 8/lab 10  (Ds&A)/2. Presentation/data structure 1.pptx
+++ b/class 8/lab 10  (Ds&A)/2. Presentation/data structure 1.pptx
@@ -9,7 +9,7 @@
     <p:sldId id="257" r:id="rId4"/>
     <p:sldId id="258" r:id="rId5"/>
     <p:sldId id="262" r:id="rId6"/>
-    <p:sldId id="260" r:id="rId7"/>
+    <p:sldId id="269" r:id="rId7"/>
     <p:sldId id="259" r:id="rId8"/>
     <p:sldId id="261" r:id="rId9"/>
     <p:sldId id="263" r:id="rId10"/>
@@ -2670,7 +2670,7 @@
           <a:p>
             <a:pPr algn="ctr"/>
             <a:r>
-              <a:rPr lang="" altLang="en-US" sz="5400" b="1">
+              <a:rPr lang="en-US" altLang="en-US" sz="5400" b="1">
                 <a:ln w="22225">
                   <a:solidFill>
                     <a:schemeClr val="accent2"/>
@@ -2687,7 +2687,7 @@
               </a:rPr>
               <a:t>Data Structure</a:t>
             </a:r>
-            <a:endParaRPr lang="" altLang="en-US" sz="5400" b="1">
+            <a:endParaRPr lang="en-US" altLang="en-US" sz="5400" b="1">
               <a:ln w="22225">
                 <a:solidFill>
                   <a:schemeClr val="accent2"/>
@@ -2706,7 +2706,7 @@
           <a:p>
             <a:pPr algn="ctr"/>
             <a:r>
-              <a:rPr lang="" altLang="en-US" sz="5400" b="1">
+              <a:rPr lang="en-US" altLang="en-US" sz="5400" b="1">
                 <a:ln w="22225">
                   <a:solidFill>
                     <a:schemeClr val="accent2"/>
@@ -2723,7 +2723,7 @@
               </a:rPr>
               <a:t> &amp; </a:t>
             </a:r>
-            <a:endParaRPr lang="" altLang="en-US" sz="5400" b="1">
+            <a:endParaRPr lang="en-US" altLang="en-US" sz="5400" b="1">
               <a:ln w="22225">
                 <a:solidFill>
                   <a:schemeClr val="accent2"/>
@@ -2742,7 +2742,7 @@
           <a:p>
             <a:pPr algn="ctr"/>
             <a:r>
-              <a:rPr lang="" altLang="en-US" sz="5400" b="1">
+              <a:rPr lang="en-US" altLang="en-US" sz="5400" b="1">
                 <a:ln w="22225">
                   <a:solidFill>
                     <a:schemeClr val="accent2"/>
@@ -2759,7 +2759,7 @@
               </a:rPr>
               <a:t>Algorithm</a:t>
             </a:r>
-            <a:endParaRPr lang="" altLang="en-US" sz="5400" b="1">
+            <a:endParaRPr lang="en-US" altLang="en-US" sz="5400" b="1">
               <a:ln w="22225">
                 <a:solidFill>
                   <a:schemeClr val="accent2"/>
@@ -2847,8 +2847,7 @@
           </a:bodyPr>
           <a:p>
             <a:r>
-              <a:rPr lang="" altLang="en-US" sz="4400" b="1">
-                <a:ln/>
+              <a:rPr lang="en-US" altLang="en-US" sz="4400" b="1">
                 <a:solidFill>
                   <a:schemeClr val="tx1"/>
                 </a:solidFill>
@@ -2864,8 +2863,7 @@
               </a:rPr>
               <a:t>Class VIII</a:t>
             </a:r>
-            <a:endParaRPr lang="" altLang="en-US" sz="4400" b="1">
-              <a:ln/>
+            <a:endParaRPr lang="en-US" altLang="en-US" sz="4400" b="1">
               <a:solidFill>
                 <a:schemeClr val="tx1"/>
               </a:solidFill>
@@ -2882,8 +2880,7 @@
           </a:p>
           <a:p>
             <a:r>
-              <a:rPr lang="" altLang="en-US" sz="4400" b="1">
-                <a:ln/>
+              <a:rPr lang="en-US" altLang="en-US" sz="4400" b="1">
                 <a:solidFill>
                   <a:schemeClr val="tx1"/>
                 </a:solidFill>
@@ -2900,8 +2897,7 @@
               <a:t>  lab </a:t>
             </a:r>
             <a:r>
-              <a:rPr lang="" altLang="en-US" sz="4400" b="1">
-                <a:ln/>
+              <a:rPr lang="en-US" altLang="en-US" sz="4400" b="1">
                 <a:solidFill>
                   <a:schemeClr val="tx1"/>
                 </a:solidFill>
@@ -2915,8 +2911,7 @@
               </a:rPr>
               <a:t>10</a:t>
             </a:r>
-            <a:endParaRPr lang="" altLang="en-US" sz="4400" b="1">
-              <a:ln/>
+            <a:endParaRPr lang="en-US" altLang="en-US" sz="4400" b="1">
               <a:solidFill>
                 <a:schemeClr val="tx1"/>
               </a:solidFill>
@@ -3308,13 +3303,13 @@
           </a:bodyPr>
           <a:p>
             <a:r>
-              <a:rPr lang="" altLang="en-US" sz="5400" b="1">
+              <a:rPr lang="en-US" altLang="en-US" sz="5400" b="1">
                 <a:latin typeface="Dingbats" charset="0"/>
                 <a:cs typeface="Dingbats" charset="0"/>
               </a:rPr>
               <a:t>Linear Data Structure</a:t>
             </a:r>
-            <a:endParaRPr lang="" altLang="en-US" sz="5400" b="1">
+            <a:endParaRPr lang="en-US" altLang="en-US" sz="5400" b="1">
               <a:latin typeface="Dingbats" charset="0"/>
               <a:cs typeface="Dingbats" charset="0"/>
             </a:endParaRPr>
@@ -3589,13 +3584,13 @@
           </a:bodyPr>
           <a:p>
             <a:r>
-              <a:rPr lang="" altLang="en-US" sz="5400" b="1">
+              <a:rPr lang="en-US" altLang="en-US" sz="5400" b="1">
                 <a:latin typeface="Dingbats" charset="0"/>
                 <a:cs typeface="Dingbats" charset="0"/>
               </a:rPr>
               <a:t>Head/Tail, Top/Bottom, </a:t>
             </a:r>
-            <a:endParaRPr lang="" altLang="en-US" sz="5400" b="1">
+            <a:endParaRPr lang="en-US" altLang="en-US" sz="5400" b="1">
               <a:latin typeface="Dingbats" charset="0"/>
               <a:cs typeface="Dingbats" charset="0"/>
             </a:endParaRPr>
@@ -3861,13 +3856,13 @@
           </a:bodyPr>
           <a:p>
             <a:r>
-              <a:rPr lang="" sz="5400" b="1">
+              <a:rPr lang="en-US" sz="5400" b="1">
                 <a:latin typeface="Dingbats" charset="0"/>
                 <a:cs typeface="Dingbats" charset="0"/>
               </a:rPr>
               <a:t>Stack</a:t>
             </a:r>
-            <a:endParaRPr lang="" sz="5400" b="1">
+            <a:endParaRPr lang="en-US" sz="5400" b="1">
               <a:latin typeface="Dingbats" charset="0"/>
               <a:cs typeface="Dingbats" charset="0"/>
             </a:endParaRPr>
@@ -4100,8 +4095,8 @@
         </p:nvSpPr>
         <p:spPr>
           <a:xfrm>
-            <a:off x="778510" y="638810"/>
-            <a:ext cx="8858250" cy="922020"/>
+            <a:off x="974090" y="650240"/>
+            <a:ext cx="8707120" cy="922020"/>
           </a:xfrm>
           <a:prstGeom prst="rect">
             <a:avLst/>
@@ -4118,7 +4113,7 @@
                 <a:latin typeface="Dingbats" charset="0"/>
                 <a:cs typeface="Dingbats" charset="0"/>
               </a:rPr>
-              <a:t>Last in First Out (LIFO)</a:t>
+              <a:t>LIFO (Last in Fast Out)</a:t>
             </a:r>
             <a:endParaRPr lang="" altLang="en-US" sz="5400" b="1">
               <a:latin typeface="Dingbats" charset="0"/>
@@ -4127,46 +4122,6 @@
           </a:p>
         </p:txBody>
       </p:sp>
-      <p:pic>
-        <p:nvPicPr>
-          <p:cNvPr id="4" name="Picture 3"/>
-          <p:cNvPicPr>
-            <a:picLocks noChangeAspect="1"/>
-          </p:cNvPicPr>
-          <p:nvPr/>
-        </p:nvPicPr>
-        <p:blipFill>
-          <a:blip r:embed="rId4">
-            <a:clrChange>
-              <a:clrFrom>
-                <a:srgbClr val="8F3919">
-                  <a:alpha val="100000"/>
-                </a:srgbClr>
-              </a:clrFrom>
-              <a:clrTo>
-                <a:srgbClr val="8F3919">
-                  <a:alpha val="100000"/>
-                  <a:alpha val="0"/>
-                </a:srgbClr>
-              </a:clrTo>
-            </a:clrChange>
-            <a:lum bright="6000"/>
-          </a:blip>
-          <a:srcRect l="1077" r="8578"/>
-          <a:stretch>
-            <a:fillRect/>
-          </a:stretch>
-        </p:blipFill>
-        <p:spPr>
-          <a:xfrm>
-            <a:off x="5459730" y="1717040"/>
-            <a:ext cx="5572760" cy="4258310"/>
-          </a:xfrm>
-          <a:prstGeom prst="ellipse">
-            <a:avLst/>
-          </a:prstGeom>
-        </p:spPr>
-      </p:pic>
       <p:sp>
         <p:nvSpPr>
           <p:cNvPr id="7" name="Text Box 6"/>
@@ -4175,8 +4130,8 @@
         </p:nvSpPr>
         <p:spPr>
           <a:xfrm>
-            <a:off x="108585" y="2670175"/>
-            <a:ext cx="5289550" cy="1198880"/>
+            <a:off x="725805" y="2574925"/>
+            <a:ext cx="4283075" cy="2799715"/>
           </a:xfrm>
           <a:prstGeom prst="rect">
             <a:avLst/>
@@ -4184,56 +4139,97 @@
           <a:noFill/>
         </p:spPr>
         <p:txBody>
-          <a:bodyPr wrap="none" rtlCol="0">
+          <a:bodyPr wrap="square" rtlCol="0">
             <a:spAutoFit/>
           </a:bodyPr>
           <a:p>
             <a:r>
-              <a:rPr lang="" altLang="en-US" sz="2400"/>
-              <a:t>Look at the stack of paratha. </a:t>
-            </a:r>
-            <a:endParaRPr lang="" altLang="en-US" sz="2400"/>
-          </a:p>
-          <a:p>
-            <a:r>
-              <a:rPr lang="" altLang="en-US" sz="2400"/>
-              <a:t>which paratha  is inserted at last </a:t>
-            </a:r>
-            <a:endParaRPr lang="" altLang="en-US" sz="2400"/>
-          </a:p>
-          <a:p>
-            <a:r>
-              <a:rPr lang="" altLang="en-US" sz="2400"/>
-              <a:t>in that stack will be taken at first</a:t>
-            </a:r>
-            <a:endParaRPr lang="" altLang="en-US" sz="2400"/>
-          </a:p>
-        </p:txBody>
-      </p:sp>
-      <p:pic>
-        <p:nvPicPr>
-          <p:cNvPr id="8" name="Picture 7"/>
-          <p:cNvPicPr>
-            <a:picLocks noChangeAspect="1"/>
-          </p:cNvPicPr>
+              <a:rPr lang="" altLang="en-US" sz="4400"/>
+              <a:t>the paratha which will put at last, will be taken at first</a:t>
+            </a:r>
+            <a:endParaRPr lang="" altLang="en-US" sz="4400"/>
+          </a:p>
+        </p:txBody>
+      </p:sp>
+      <p:grpSp>
+        <p:nvGrpSpPr>
+          <p:cNvPr id="12" name="Group 11"/>
+          <p:cNvGrpSpPr/>
           <p:nvPr/>
-        </p:nvPicPr>
-        <p:blipFill>
-          <a:blip r:embed="rId5"/>
-          <a:stretch>
-            <a:fillRect/>
-          </a:stretch>
-        </p:blipFill>
-        <p:spPr>
-          <a:xfrm>
-            <a:off x="7686040" y="1386205"/>
-            <a:ext cx="1788795" cy="1788795"/>
-          </a:xfrm>
-          <a:prstGeom prst="rect">
-            <a:avLst/>
-          </a:prstGeom>
-        </p:spPr>
-      </p:pic>
+        </p:nvGrpSpPr>
+        <p:grpSpPr>
+          <a:xfrm>
+            <a:off x="6542405" y="1153795"/>
+            <a:ext cx="5572760" cy="4665345"/>
+            <a:chOff x="10303" y="1817"/>
+            <a:chExt cx="8776" cy="7347"/>
+          </a:xfrm>
+        </p:grpSpPr>
+        <p:pic>
+          <p:nvPicPr>
+            <p:cNvPr id="8" name="Picture 7"/>
+            <p:cNvPicPr>
+              <a:picLocks noChangeAspect="1"/>
+            </p:cNvPicPr>
+            <p:nvPr/>
+          </p:nvPicPr>
+          <p:blipFill>
+            <a:blip r:embed="rId4">
+              <a:clrChange>
+                <a:clrFrom>
+                  <a:srgbClr val="8F3919">
+                    <a:alpha val="100000"/>
+                  </a:srgbClr>
+                </a:clrFrom>
+                <a:clrTo>
+                  <a:srgbClr val="8F3919">
+                    <a:alpha val="100000"/>
+                    <a:alpha val="0"/>
+                  </a:srgbClr>
+                </a:clrTo>
+              </a:clrChange>
+              <a:lum bright="6000"/>
+            </a:blip>
+            <a:srcRect l="1077" r="8578"/>
+            <a:stretch>
+              <a:fillRect/>
+            </a:stretch>
+          </p:blipFill>
+          <p:spPr>
+            <a:xfrm>
+              <a:off x="10303" y="2458"/>
+              <a:ext cx="8776" cy="6706"/>
+            </a:xfrm>
+            <a:prstGeom prst="ellipse">
+              <a:avLst/>
+            </a:prstGeom>
+          </p:spPr>
+        </p:pic>
+        <p:pic>
+          <p:nvPicPr>
+            <p:cNvPr id="9" name="Picture 8"/>
+            <p:cNvPicPr>
+              <a:picLocks noChangeAspect="1"/>
+            </p:cNvPicPr>
+            <p:nvPr/>
+          </p:nvPicPr>
+          <p:blipFill>
+            <a:blip r:embed="rId5"/>
+            <a:stretch>
+              <a:fillRect/>
+            </a:stretch>
+          </p:blipFill>
+          <p:spPr>
+            <a:xfrm>
+              <a:off x="13877" y="1817"/>
+              <a:ext cx="2817" cy="2817"/>
+            </a:xfrm>
+            <a:prstGeom prst="rect">
+              <a:avLst/>
+            </a:prstGeom>
+          </p:spPr>
+        </p:pic>
+      </p:grpSp>
     </p:spTree>
   </p:cSld>
   <p:clrMapOvr>
@@ -4421,13 +4417,13 @@
           </a:bodyPr>
           <a:p>
             <a:r>
-              <a:rPr lang="" altLang="en-US" sz="5400" b="1">
+              <a:rPr lang="en-US" altLang="en-US" sz="5400" b="1">
                 <a:latin typeface="Dingbats" charset="0"/>
                 <a:cs typeface="Dingbats" charset="0"/>
               </a:rPr>
               <a:t>Original vs Reverse </a:t>
             </a:r>
-            <a:endParaRPr lang="" altLang="en-US" sz="5400" b="1">
+            <a:endParaRPr lang="en-US" altLang="en-US" sz="5400" b="1">
               <a:latin typeface="Dingbats" charset="0"/>
               <a:cs typeface="Dingbats" charset="0"/>
             </a:endParaRPr>
@@ -4692,13 +4688,13 @@
           </a:bodyPr>
           <a:p>
             <a:r>
-              <a:rPr lang="" altLang="en-US" sz="5400" b="1">
+              <a:rPr lang="en-US" altLang="en-US" sz="5400" b="1">
                 <a:latin typeface="Dingbats" charset="0"/>
                 <a:cs typeface="Dingbats" charset="0"/>
               </a:rPr>
               <a:t>Stack Abstract Data Type</a:t>
             </a:r>
-            <a:endParaRPr lang="" altLang="en-US" sz="5400" b="1">
+            <a:endParaRPr lang="en-US" altLang="en-US" sz="5400" b="1">
               <a:latin typeface="Dingbats" charset="0"/>
               <a:cs typeface="Dingbats" charset="0"/>
             </a:endParaRPr>
@@ -4772,10 +4768,10 @@
               <a:buChar char="•"/>
             </a:pPr>
             <a:r>
-              <a:rPr lang="" altLang="en-US" sz="3200"/>
+              <a:rPr lang="en-US" altLang="en-US" sz="3200"/>
               <a:t>push(item)</a:t>
             </a:r>
-            <a:endParaRPr lang="" altLang="en-US" sz="3200"/>
+            <a:endParaRPr lang="en-US" altLang="en-US" sz="3200"/>
           </a:p>
           <a:p>
             <a:pPr marL="285750" indent="-285750">
@@ -4783,10 +4779,10 @@
               <a:buChar char="•"/>
             </a:pPr>
             <a:r>
-              <a:rPr lang="" altLang="en-US" sz="3200"/>
+              <a:rPr lang="en-US" altLang="en-US" sz="3200"/>
               <a:t>pop</a:t>
             </a:r>
-            <a:endParaRPr lang="" altLang="en-US" sz="3200"/>
+            <a:endParaRPr lang="en-US" altLang="en-US" sz="3200"/>
           </a:p>
           <a:p>
             <a:pPr marL="285750" indent="-285750">
@@ -4794,10 +4790,10 @@
               <a:buChar char="•"/>
             </a:pPr>
             <a:r>
-              <a:rPr lang="" altLang="en-US" sz="3200"/>
+              <a:rPr lang="en-US" altLang="en-US" sz="3200"/>
               <a:t>peek() </a:t>
             </a:r>
-            <a:endParaRPr lang="" altLang="en-US" sz="3200"/>
+            <a:endParaRPr lang="en-US" altLang="en-US" sz="3200"/>
           </a:p>
           <a:p>
             <a:pPr marL="285750" indent="-285750">
@@ -4805,10 +4801,10 @@
               <a:buChar char="•"/>
             </a:pPr>
             <a:r>
-              <a:rPr lang="" altLang="en-US" sz="3200"/>
+              <a:rPr lang="en-US" altLang="en-US" sz="3200"/>
               <a:t>isEmpty()</a:t>
             </a:r>
-            <a:endParaRPr lang="" altLang="en-US" sz="3200"/>
+            <a:endParaRPr lang="en-US" altLang="en-US" sz="3200"/>
           </a:p>
           <a:p>
             <a:pPr marL="285750" indent="-285750">
@@ -4816,10 +4812,10 @@
               <a:buChar char="•"/>
             </a:pPr>
             <a:r>
-              <a:rPr lang="" altLang="en-US" sz="3200"/>
+              <a:rPr lang="en-US" altLang="en-US" sz="3200"/>
               <a:t>size()</a:t>
             </a:r>
-            <a:endParaRPr lang="" altLang="en-US" sz="3200"/>
+            <a:endParaRPr lang="en-US" altLang="en-US" sz="3200"/>
           </a:p>
         </p:txBody>
       </p:sp>
@@ -5010,13 +5006,13 @@
           </a:bodyPr>
           <a:p>
             <a:r>
-              <a:rPr lang="" altLang="en-US" sz="4400" b="1">
+              <a:rPr lang="en-US" altLang="en-US" sz="4400" b="1">
                 <a:latin typeface="Dingbats" charset="0"/>
                 <a:cs typeface="Dingbats" charset="0"/>
               </a:rPr>
               <a:t>Implementation using Python</a:t>
             </a:r>
-            <a:endParaRPr lang="" altLang="en-US" sz="4400" b="1">
+            <a:endParaRPr lang="en-US" altLang="en-US" sz="4400" b="1">
               <a:latin typeface="Dingbats" charset="0"/>
               <a:cs typeface="Dingbats" charset="0"/>
             </a:endParaRPr>
@@ -5336,10 +5332,10 @@
           </a:bodyPr>
           <a:p>
             <a:r>
-              <a:rPr lang="" altLang="en-US" sz="2800"/>
+              <a:rPr lang="en-US" altLang="en-US" sz="2800"/>
               <a:t>pythonds is a module of Python which is used to implement of Data Structure</a:t>
             </a:r>
-            <a:endParaRPr lang="" altLang="en-US" sz="2800"/>
+            <a:endParaRPr lang="en-US" altLang="en-US" sz="2800"/>
           </a:p>
         </p:txBody>
       </p:sp>
@@ -5530,13 +5526,13 @@
           </a:bodyPr>
           <a:p>
             <a:r>
-              <a:rPr lang="" altLang="en-US" sz="5400" b="1">
+              <a:rPr lang="en-US" altLang="en-US" sz="5400" b="1">
                 <a:latin typeface="Dingbats" charset="0"/>
                 <a:cs typeface="Dingbats" charset="0"/>
               </a:rPr>
               <a:t>Output</a:t>
             </a:r>
-            <a:endParaRPr lang="" altLang="en-US" sz="5400" b="1">
+            <a:endParaRPr lang="en-US" altLang="en-US" sz="5400" b="1">
               <a:latin typeface="Dingbats" charset="0"/>
               <a:cs typeface="Dingbats" charset="0"/>
             </a:endParaRPr>

</xml_diff>